<commit_message>
Correcao do Modelo de Banco de dados
</commit_message>
<xml_diff>
--- a/04-DocumentosDoProjeto/Modelo Conceitual & Logico do Banco de Dados.pptx
+++ b/04-DocumentosDoProjeto/Modelo Conceitual & Logico do Banco de Dados.pptx
@@ -116,7 +116,7 @@
 <file path=ppt/revisionInfo.xml><?xml version="1.0" encoding="utf-8"?>
 <p1510:revInfo xmlns:a="http://schemas.openxmlformats.org/drawingml/2006/main" xmlns:r="http://schemas.openxmlformats.org/officeDocument/2006/relationships" xmlns:p1510="http://schemas.microsoft.com/office/powerpoint/2015/10/main">
   <p1510:revLst>
-    <p1510:client id="{2FDEAF6A-7EFB-4C69-8BF1-DB957C230BEE}" v="1" dt="2020-10-23T19:02:11.702"/>
+    <p1510:client id="{2FDEAF6A-7EFB-4C69-8BF1-DB957C230BEE}" v="3" dt="2020-10-23T23:37:06.870"/>
   </p1510:revLst>
 </p1510:revInfo>
 </file>
@@ -125,13 +125,13 @@
 <pc:chgInfo xmlns:a="http://schemas.openxmlformats.org/drawingml/2006/main" xmlns:r="http://schemas.openxmlformats.org/officeDocument/2006/relationships" xmlns:ac="http://schemas.microsoft.com/office/drawing/2013/main/command" xmlns:pc="http://schemas.microsoft.com/office/powerpoint/2013/main/command">
   <pc:docChgLst>
     <pc:chgData name="Samir Nagib" userId="4f5fd9d0a02b8421" providerId="LiveId" clId="{2FDEAF6A-7EFB-4C69-8BF1-DB957C230BEE}"/>
-    <pc:docChg chg="undo custSel addSld modSld">
-      <pc:chgData name="Samir Nagib" userId="4f5fd9d0a02b8421" providerId="LiveId" clId="{2FDEAF6A-7EFB-4C69-8BF1-DB957C230BEE}" dt="2020-10-23T19:02:36.186" v="68" actId="1035"/>
+    <pc:docChg chg="undo custSel addSld delSld modSld">
+      <pc:chgData name="Samir Nagib" userId="4f5fd9d0a02b8421" providerId="LiveId" clId="{2FDEAF6A-7EFB-4C69-8BF1-DB957C230BEE}" dt="2020-10-23T23:37:20.167" v="86" actId="1076"/>
       <pc:docMkLst>
         <pc:docMk/>
       </pc:docMkLst>
       <pc:sldChg chg="addSp delSp modSp mod">
-        <pc:chgData name="Samir Nagib" userId="4f5fd9d0a02b8421" providerId="LiveId" clId="{2FDEAF6A-7EFB-4C69-8BF1-DB957C230BEE}" dt="2020-10-23T19:02:36.186" v="68" actId="1035"/>
+        <pc:chgData name="Samir Nagib" userId="4f5fd9d0a02b8421" providerId="LiveId" clId="{2FDEAF6A-7EFB-4C69-8BF1-DB957C230BEE}" dt="2020-10-23T23:34:48.397" v="71" actId="1076"/>
         <pc:sldMkLst>
           <pc:docMk/>
           <pc:sldMk cId="467273333" sldId="256"/>
@@ -153,7 +153,15 @@
           </ac:spMkLst>
         </pc:spChg>
         <pc:picChg chg="add mod">
-          <ac:chgData name="Samir Nagib" userId="4f5fd9d0a02b8421" providerId="LiveId" clId="{2FDEAF6A-7EFB-4C69-8BF1-DB957C230BEE}" dt="2020-10-23T19:02:36.186" v="68" actId="1035"/>
+          <ac:chgData name="Samir Nagib" userId="4f5fd9d0a02b8421" providerId="LiveId" clId="{2FDEAF6A-7EFB-4C69-8BF1-DB957C230BEE}" dt="2020-10-23T23:34:48.397" v="71" actId="1076"/>
+          <ac:picMkLst>
+            <pc:docMk/>
+            <pc:sldMk cId="467273333" sldId="256"/>
+            <ac:picMk id="3" creationId="{227CE1FD-7BCD-4A9D-B70F-942C3AEBAD28}"/>
+          </ac:picMkLst>
+        </pc:picChg>
+        <pc:picChg chg="add del mod">
+          <ac:chgData name="Samir Nagib" userId="4f5fd9d0a02b8421" providerId="LiveId" clId="{2FDEAF6A-7EFB-4C69-8BF1-DB957C230BEE}" dt="2020-10-23T23:34:40.328" v="69" actId="478"/>
           <ac:picMkLst>
             <pc:docMk/>
             <pc:sldMk cId="467273333" sldId="256"/>
@@ -161,8 +169,8 @@
           </ac:picMkLst>
         </pc:picChg>
       </pc:sldChg>
-      <pc:sldChg chg="addSp delSp modSp add mod">
-        <pc:chgData name="Samir Nagib" userId="4f5fd9d0a02b8421" providerId="LiveId" clId="{2FDEAF6A-7EFB-4C69-8BF1-DB957C230BEE}" dt="2020-10-23T19:02:20.771" v="61" actId="1076"/>
+      <pc:sldChg chg="addSp delSp modSp add del mod">
+        <pc:chgData name="Samir Nagib" userId="4f5fd9d0a02b8421" providerId="LiveId" clId="{2FDEAF6A-7EFB-4C69-8BF1-DB957C230BEE}" dt="2020-10-23T23:37:20.167" v="86" actId="1076"/>
         <pc:sldMkLst>
           <pc:docMk/>
           <pc:sldMk cId="1319646135" sldId="257"/>
@@ -183,6 +191,14 @@
             <ac:picMk id="3" creationId="{59774300-F412-4FE0-90EA-D8B10EF42684}"/>
           </ac:picMkLst>
         </pc:picChg>
+        <pc:picChg chg="add del mod">
+          <ac:chgData name="Samir Nagib" userId="4f5fd9d0a02b8421" providerId="LiveId" clId="{2FDEAF6A-7EFB-4C69-8BF1-DB957C230BEE}" dt="2020-10-23T23:36:06.133" v="81" actId="478"/>
+          <ac:picMkLst>
+            <pc:docMk/>
+            <pc:sldMk cId="1319646135" sldId="257"/>
+            <ac:picMk id="3" creationId="{BAE85E61-D508-4FA3-B84B-D294FE9DFA75}"/>
+          </ac:picMkLst>
+        </pc:picChg>
         <pc:picChg chg="del">
           <ac:chgData name="Samir Nagib" userId="4f5fd9d0a02b8421" providerId="LiveId" clId="{2FDEAF6A-7EFB-4C69-8BF1-DB957C230BEE}" dt="2020-10-23T18:59:15.103" v="44" actId="478"/>
           <ac:picMkLst>
@@ -191,8 +207,16 @@
             <ac:picMk id="4" creationId="{C557B906-249B-4D07-989F-A49F63D47C44}"/>
           </ac:picMkLst>
         </pc:picChg>
-        <pc:picChg chg="add mod">
-          <ac:chgData name="Samir Nagib" userId="4f5fd9d0a02b8421" providerId="LiveId" clId="{2FDEAF6A-7EFB-4C69-8BF1-DB957C230BEE}" dt="2020-10-23T19:02:20.771" v="61" actId="1076"/>
+        <pc:picChg chg="add mod ord">
+          <ac:chgData name="Samir Nagib" userId="4f5fd9d0a02b8421" providerId="LiveId" clId="{2FDEAF6A-7EFB-4C69-8BF1-DB957C230BEE}" dt="2020-10-23T23:37:20.167" v="86" actId="1076"/>
+          <ac:picMkLst>
+            <pc:docMk/>
+            <pc:sldMk cId="1319646135" sldId="257"/>
+            <ac:picMk id="5" creationId="{0828ED98-7AAA-4B2B-9E36-67794FE8C841}"/>
+          </ac:picMkLst>
+        </pc:picChg>
+        <pc:picChg chg="add del mod">
+          <ac:chgData name="Samir Nagib" userId="4f5fd9d0a02b8421" providerId="LiveId" clId="{2FDEAF6A-7EFB-4C69-8BF1-DB957C230BEE}" dt="2020-10-23T23:34:59.037" v="74" actId="478"/>
           <ac:picMkLst>
             <pc:docMk/>
             <pc:sldMk cId="1319646135" sldId="257"/>
@@ -3293,10 +3317,10 @@
       </p:grpSp>
       <p:pic>
         <p:nvPicPr>
-          <p:cNvPr id="4" name="Imagem 3">
+          <p:cNvPr id="3" name="Imagem 2">
             <a:extLst>
               <a:ext uri="{FF2B5EF4-FFF2-40B4-BE49-F238E27FC236}">
-                <a16:creationId xmlns:a16="http://schemas.microsoft.com/office/drawing/2014/main" id="{C557B906-249B-4D07-989F-A49F63D47C44}"/>
+                <a16:creationId xmlns:a16="http://schemas.microsoft.com/office/drawing/2014/main" id="{227CE1FD-7BCD-4A9D-B70F-942C3AEBAD28}"/>
               </a:ext>
             </a:extLst>
           </p:cNvPr>
@@ -3313,8 +3337,8 @@
         </p:blipFill>
         <p:spPr>
           <a:xfrm>
-            <a:off x="0" y="752690"/>
-            <a:ext cx="9144000" cy="6046587"/>
+            <a:off x="0" y="707363"/>
+            <a:ext cx="9144000" cy="6053959"/>
           </a:xfrm>
           <a:prstGeom prst="rect">
             <a:avLst/>
@@ -3351,6 +3375,42 @@
           <a:chExt cx="0" cy="0"/>
         </a:xfrm>
       </p:grpSpPr>
+      <p:pic>
+        <p:nvPicPr>
+          <p:cNvPr id="5" name="Imagem 4" descr="Diagrama&#10;&#10;Descrição gerada automaticamente">
+            <a:extLst>
+              <a:ext uri="{FF2B5EF4-FFF2-40B4-BE49-F238E27FC236}">
+                <a16:creationId xmlns:a16="http://schemas.microsoft.com/office/drawing/2014/main" id="{0828ED98-7AAA-4B2B-9E36-67794FE8C841}"/>
+              </a:ext>
+            </a:extLst>
+          </p:cNvPr>
+          <p:cNvPicPr>
+            <a:picLocks noChangeAspect="1"/>
+          </p:cNvPicPr>
+          <p:nvPr/>
+        </p:nvPicPr>
+        <p:blipFill>
+          <a:blip r:embed="rId2">
+            <a:extLst>
+              <a:ext uri="{28A0092B-C50C-407E-A947-70E740481C1C}">
+                <a14:useLocalDpi xmlns:a14="http://schemas.microsoft.com/office/drawing/2010/main" val="0"/>
+              </a:ext>
+            </a:extLst>
+          </a:blip>
+          <a:stretch>
+            <a:fillRect/>
+          </a:stretch>
+        </p:blipFill>
+        <p:spPr>
+          <a:xfrm>
+            <a:off x="-63759" y="0"/>
+            <a:ext cx="8935959" cy="6858000"/>
+          </a:xfrm>
+          <a:prstGeom prst="rect">
+            <a:avLst/>
+          </a:prstGeom>
+        </p:spPr>
+      </p:pic>
       <p:grpSp>
         <p:nvGrpSpPr>
           <p:cNvPr id="11" name="Agrupar 10">
@@ -3386,7 +3446,7 @@
             <p:nvPr/>
           </p:nvPicPr>
           <p:blipFill>
-            <a:blip r:embed="rId2" r:link="rId3">
+            <a:blip r:embed="rId3" r:link="rId4">
               <a:extLst>
                 <a:ext uri="{28A0092B-C50C-407E-A947-70E740481C1C}">
                   <a14:useLocalDpi xmlns:a14="http://schemas.microsoft.com/office/drawing/2010/main" val="0"/>
@@ -3578,42 +3638,6 @@
           </p:txBody>
         </p:sp>
       </p:grpSp>
-      <p:pic>
-        <p:nvPicPr>
-          <p:cNvPr id="6" name="Imagem 5" descr="Diagrama&#10;&#10;Descrição gerada automaticamente">
-            <a:extLst>
-              <a:ext uri="{FF2B5EF4-FFF2-40B4-BE49-F238E27FC236}">
-                <a16:creationId xmlns:a16="http://schemas.microsoft.com/office/drawing/2014/main" id="{A41CEE31-C9C5-42E1-A064-F9B33C3963D6}"/>
-              </a:ext>
-            </a:extLst>
-          </p:cNvPr>
-          <p:cNvPicPr>
-            <a:picLocks noChangeAspect="1"/>
-          </p:cNvPicPr>
-          <p:nvPr/>
-        </p:nvPicPr>
-        <p:blipFill>
-          <a:blip r:embed="rId4" r:link="rId5">
-            <a:extLst>
-              <a:ext uri="{28A0092B-C50C-407E-A947-70E740481C1C}">
-                <a14:useLocalDpi xmlns:a14="http://schemas.microsoft.com/office/drawing/2010/main" val="0"/>
-              </a:ext>
-            </a:extLst>
-          </a:blip>
-          <a:stretch>
-            <a:fillRect/>
-          </a:stretch>
-        </p:blipFill>
-        <p:spPr>
-          <a:xfrm>
-            <a:off x="0" y="707363"/>
-            <a:ext cx="9144000" cy="6168142"/>
-          </a:xfrm>
-          <a:prstGeom prst="rect">
-            <a:avLst/>
-          </a:prstGeom>
-        </p:spPr>
-      </p:pic>
     </p:spTree>
     <p:extLst>
       <p:ext uri="{BB962C8B-B14F-4D97-AF65-F5344CB8AC3E}">

</xml_diff>